<commit_message>
add exception & inheritance & Graphic Interface
</commit_message>
<xml_diff>
--- a/时钟应用程序_v3.0.pptx
+++ b/时钟应用程序_v3.0.pptx
@@ -283,7 +283,7 @@
           <a:p>
             <a:fld id="{895DD3A8-2880-42F0-B5A6-F54997233411}" type="datetimeFigureOut">
               <a:rPr lang="zh-CN" altLang="en-US" smtClean="0"/>
-              <a:t>2015/4/3</a:t>
+              <a:t>2015/5/6</a:t>
             </a:fld>
             <a:endParaRPr lang="zh-CN" altLang="en-US"/>
           </a:p>
@@ -2015,7 +2015,7 @@
               <a:pPr>
                 <a:defRPr/>
               </a:pPr>
-              <a:t>2015/4/3</a:t>
+              <a:t>2015/5/6</a:t>
             </a:fld>
             <a:endParaRPr lang="zh-CN" altLang="en-US"/>
           </a:p>
@@ -2584,7 +2584,7 @@
               <a:pPr>
                 <a:defRPr/>
               </a:pPr>
-              <a:t>2015/4/3</a:t>
+              <a:t>2015/5/6</a:t>
             </a:fld>
             <a:endParaRPr lang="zh-CN" altLang="en-US"/>
           </a:p>
@@ -2870,7 +2870,7 @@
               <a:pPr>
                 <a:defRPr/>
               </a:pPr>
-              <a:t>2015/4/3</a:t>
+              <a:t>2015/5/6</a:t>
             </a:fld>
             <a:endParaRPr lang="zh-CN" altLang="en-US"/>
           </a:p>
@@ -3067,7 +3067,7 @@
               <a:pPr>
                 <a:defRPr/>
               </a:pPr>
-              <a:t>2015/4/3</a:t>
+              <a:t>2015/5/6</a:t>
             </a:fld>
             <a:endParaRPr lang="zh-CN" altLang="en-US"/>
           </a:p>
@@ -3274,7 +3274,7 @@
               <a:pPr>
                 <a:defRPr/>
               </a:pPr>
-              <a:t>2015/4/3</a:t>
+              <a:t>2015/5/6</a:t>
             </a:fld>
             <a:endParaRPr lang="zh-CN" altLang="en-US"/>
           </a:p>
@@ -3830,7 +3830,7 @@
               <a:pPr>
                 <a:defRPr/>
               </a:pPr>
-              <a:t>2015/4/3</a:t>
+              <a:t>2015/5/6</a:t>
             </a:fld>
             <a:endParaRPr lang="zh-CN" altLang="en-US"/>
           </a:p>
@@ -3983,7 +3983,7 @@
               <a:pPr>
                 <a:defRPr/>
               </a:pPr>
-              <a:t>2015/4/3</a:t>
+              <a:t>2015/5/6</a:t>
             </a:fld>
             <a:endParaRPr lang="zh-CN" altLang="en-US"/>
           </a:p>
@@ -4134,7 +4134,7 @@
               <a:pPr>
                 <a:defRPr/>
               </a:pPr>
-              <a:t>2015/4/3</a:t>
+              <a:t>2015/5/6</a:t>
             </a:fld>
             <a:endParaRPr lang="zh-CN" altLang="en-US"/>
           </a:p>
@@ -4406,7 +4406,7 @@
               <a:pPr>
                 <a:defRPr/>
               </a:pPr>
-              <a:t>2015/4/3</a:t>
+              <a:t>2015/5/6</a:t>
             </a:fld>
             <a:endParaRPr lang="zh-CN" altLang="en-US"/>
           </a:p>
@@ -4721,7 +4721,7 @@
               <a:pPr>
                 <a:defRPr/>
               </a:pPr>
-              <a:t>2015/4/3</a:t>
+              <a:t>2015/5/6</a:t>
             </a:fld>
             <a:endParaRPr lang="zh-CN" altLang="en-US"/>
           </a:p>
@@ -5170,7 +5170,7 @@
               <a:pPr>
                 <a:defRPr/>
               </a:pPr>
-              <a:t>2015/4/3</a:t>
+              <a:t>2015/5/6</a:t>
             </a:fld>
             <a:endParaRPr lang="zh-CN" altLang="en-US"/>
           </a:p>
@@ -5322,7 +5322,7 @@
               <a:pPr>
                 <a:defRPr/>
               </a:pPr>
-              <a:t>2015/4/3</a:t>
+              <a:t>2015/5/6</a:t>
             </a:fld>
             <a:endParaRPr lang="zh-CN" altLang="en-US"/>
           </a:p>
@@ -5451,7 +5451,7 @@
               <a:pPr>
                 <a:defRPr/>
               </a:pPr>
-              <a:t>2015/4/3</a:t>
+              <a:t>2015/5/6</a:t>
             </a:fld>
             <a:endParaRPr lang="zh-CN" altLang="en-US"/>
           </a:p>
@@ -5744,7 +5744,7 @@
               <a:pPr>
                 <a:defRPr/>
               </a:pPr>
-              <a:t>2015/4/3</a:t>
+              <a:t>2015/5/6</a:t>
             </a:fld>
             <a:endParaRPr lang="zh-CN" altLang="en-US"/>
           </a:p>
@@ -13361,12 +13361,12 @@
           <a:graphicData uri="http://schemas.openxmlformats.org/presentationml/2006/ole">
             <mc:AlternateContent xmlns:mc="http://schemas.openxmlformats.org/markup-compatibility/2006">
               <mc:Choice xmlns:v="urn:schemas-microsoft-com:vml" Requires="v">
-                <p:oleObj spid="_x0000_s1039" name="Document" r:id="rId3" imgW="8605871" imgH="5318830" progId="Word.Document.8">
+                <p:oleObj spid="_x0000_s1040" name="Document" r:id="rId4" imgW="8605871" imgH="5318830" progId="Word.Document.8">
                   <p:embed/>
                 </p:oleObj>
               </mc:Choice>
               <mc:Fallback>
-                <p:oleObj name="Document" r:id="rId3" imgW="8605871" imgH="5318830" progId="Word.Document.8">
+                <p:oleObj name="Document" r:id="rId4" imgW="8605871" imgH="5318830" progId="Word.Document.8">
                   <p:embed/>
                   <p:pic>
                     <p:nvPicPr>
@@ -13377,7 +13377,7 @@
                       <p:nvPr/>
                     </p:nvPicPr>
                     <p:blipFill>
-                      <a:blip r:embed="rId4"/>
+                      <a:blip r:embed="rId5"/>
                       <a:srcRect/>
                       <a:stretch>
                         <a:fillRect/>
@@ -15830,6 +15830,13 @@
   <p:transition spd="slow">
     <p:fade thruBlk="1"/>
   </p:transition>
+  <p:timing>
+    <p:tnLst>
+      <p:par>
+        <p:cTn id="1" dur="indefinite" restart="never" nodeType="tmRoot"/>
+      </p:par>
+    </p:tnLst>
+  </p:timing>
 </p:sld>
 </file>
 
@@ -16039,6 +16046,13 @@
   <p:transition spd="slow">
     <p:fade thruBlk="1"/>
   </p:transition>
+  <p:timing>
+    <p:tnLst>
+      <p:par>
+        <p:cTn id="1" dur="indefinite" restart="never" nodeType="tmRoot"/>
+      </p:par>
+    </p:tnLst>
+  </p:timing>
 </p:sld>
 </file>
 
@@ -16436,7 +16450,11 @@
             <a:graphicFrameLocks noGrp="1"/>
           </p:cNvGraphicFramePr>
           <p:nvPr>
-            <p:extLst/>
+            <p:extLst>
+              <p:ext uri="{D42A27DB-BD31-4B8C-83A1-F6EECF244321}">
+                <p14:modId xmlns:p14="http://schemas.microsoft.com/office/powerpoint/2010/main" val="4106135443"/>
+              </p:ext>
+            </p:extLst>
           </p:nvPr>
         </p:nvGraphicFramePr>
         <p:xfrm>
@@ -16695,16 +16713,13 @@
                         </a:rPr>
                         <a:t>}</a:t>
                       </a:r>
-                      <a:r>
-                        <a:rPr lang="zh-CN" altLang="en-US" sz="1600" dirty="0" smtClean="0">
-                          <a:solidFill>
-                            <a:srgbClr val="FF2121"/>
-                          </a:solidFill>
-                          <a:latin typeface="微软雅黑" panose="020B0503020204020204" pitchFamily="34" charset="-122"/>
-                          <a:ea typeface="微软雅黑" panose="020B0503020204020204" pitchFamily="34" charset="-122"/>
-                        </a:rPr>
-                        <a:t>；</a:t>
-                      </a:r>
+                      <a:endParaRPr lang="zh-CN" altLang="en-US" sz="1600" dirty="0" smtClean="0">
+                        <a:solidFill>
+                          <a:srgbClr val="FF2121"/>
+                        </a:solidFill>
+                        <a:latin typeface="微软雅黑" panose="020B0503020204020204" pitchFamily="34" charset="-122"/>
+                        <a:ea typeface="微软雅黑" panose="020B0503020204020204" pitchFamily="34" charset="-122"/>
+                      </a:endParaRPr>
                     </a:p>
                   </a:txBody>
                   <a:tcPr>
@@ -17152,7 +17167,7 @@
         </p:nvSpPr>
         <p:spPr>
           <a:xfrm>
-            <a:off x="1155668" y="2448098"/>
+            <a:off x="1173595" y="2436049"/>
             <a:ext cx="2912276" cy="987748"/>
           </a:xfrm>
           <a:prstGeom prst="rect">

</xml_diff>